<commit_message>
sentence removed in figure; char-cnn shortened; fofe becomes richer
</commit_message>
<xml_diff>
--- a/ppt.pptx
+++ b/ppt.pptx
@@ -209,7 +209,7 @@
           <a:p>
             <a:fld id="{D07D4BFB-5337-F24A-A33C-2E310DD8F672}" type="datetimeFigureOut">
               <a:rPr lang="en-US" smtClean="0"/>
-              <a:t>2/5/17</a:t>
+              <a:t>2/6/17</a:t>
             </a:fld>
             <a:endParaRPr lang="en-US"/>
           </a:p>
@@ -1228,7 +1228,7 @@
           <a:p>
             <a:fld id="{C47D408F-8A80-EC46-9B06-2A4F39B76EBA}" type="datetimeFigureOut">
               <a:rPr lang="en-US" smtClean="0"/>
-              <a:t>2/5/17</a:t>
+              <a:t>2/6/17</a:t>
             </a:fld>
             <a:endParaRPr lang="en-US"/>
           </a:p>
@@ -1398,7 +1398,7 @@
           <a:p>
             <a:fld id="{C47D408F-8A80-EC46-9B06-2A4F39B76EBA}" type="datetimeFigureOut">
               <a:rPr lang="en-US" smtClean="0"/>
-              <a:t>2/5/17</a:t>
+              <a:t>2/6/17</a:t>
             </a:fld>
             <a:endParaRPr lang="en-US"/>
           </a:p>
@@ -1578,7 +1578,7 @@
           <a:p>
             <a:fld id="{C47D408F-8A80-EC46-9B06-2A4F39B76EBA}" type="datetimeFigureOut">
               <a:rPr lang="en-US" smtClean="0"/>
-              <a:t>2/5/17</a:t>
+              <a:t>2/6/17</a:t>
             </a:fld>
             <a:endParaRPr lang="en-US"/>
           </a:p>
@@ -1748,7 +1748,7 @@
           <a:p>
             <a:fld id="{C47D408F-8A80-EC46-9B06-2A4F39B76EBA}" type="datetimeFigureOut">
               <a:rPr lang="en-US" smtClean="0"/>
-              <a:t>2/5/17</a:t>
+              <a:t>2/6/17</a:t>
             </a:fld>
             <a:endParaRPr lang="en-US"/>
           </a:p>
@@ -1992,7 +1992,7 @@
           <a:p>
             <a:fld id="{C47D408F-8A80-EC46-9B06-2A4F39B76EBA}" type="datetimeFigureOut">
               <a:rPr lang="en-US" smtClean="0"/>
-              <a:t>2/5/17</a:t>
+              <a:t>2/6/17</a:t>
             </a:fld>
             <a:endParaRPr lang="en-US"/>
           </a:p>
@@ -2224,7 +2224,7 @@
           <a:p>
             <a:fld id="{C47D408F-8A80-EC46-9B06-2A4F39B76EBA}" type="datetimeFigureOut">
               <a:rPr lang="en-US" smtClean="0"/>
-              <a:t>2/5/17</a:t>
+              <a:t>2/6/17</a:t>
             </a:fld>
             <a:endParaRPr lang="en-US"/>
           </a:p>
@@ -2591,7 +2591,7 @@
           <a:p>
             <a:fld id="{C47D408F-8A80-EC46-9B06-2A4F39B76EBA}" type="datetimeFigureOut">
               <a:rPr lang="en-US" smtClean="0"/>
-              <a:t>2/5/17</a:t>
+              <a:t>2/6/17</a:t>
             </a:fld>
             <a:endParaRPr lang="en-US"/>
           </a:p>
@@ -2709,7 +2709,7 @@
           <a:p>
             <a:fld id="{C47D408F-8A80-EC46-9B06-2A4F39B76EBA}" type="datetimeFigureOut">
               <a:rPr lang="en-US" smtClean="0"/>
-              <a:t>2/5/17</a:t>
+              <a:t>2/6/17</a:t>
             </a:fld>
             <a:endParaRPr lang="en-US"/>
           </a:p>
@@ -2804,7 +2804,7 @@
           <a:p>
             <a:fld id="{C47D408F-8A80-EC46-9B06-2A4F39B76EBA}" type="datetimeFigureOut">
               <a:rPr lang="en-US" smtClean="0"/>
-              <a:t>2/5/17</a:t>
+              <a:t>2/6/17</a:t>
             </a:fld>
             <a:endParaRPr lang="en-US"/>
           </a:p>
@@ -3081,7 +3081,7 @@
           <a:p>
             <a:fld id="{C47D408F-8A80-EC46-9B06-2A4F39B76EBA}" type="datetimeFigureOut">
               <a:rPr lang="en-US" smtClean="0"/>
-              <a:t>2/5/17</a:t>
+              <a:t>2/6/17</a:t>
             </a:fld>
             <a:endParaRPr lang="en-US"/>
           </a:p>
@@ -3338,7 +3338,7 @@
           <a:p>
             <a:fld id="{C47D408F-8A80-EC46-9B06-2A4F39B76EBA}" type="datetimeFigureOut">
               <a:rPr lang="en-US" smtClean="0"/>
-              <a:t>2/5/17</a:t>
+              <a:t>2/6/17</a:t>
             </a:fld>
             <a:endParaRPr lang="en-US"/>
           </a:p>
@@ -3551,7 +3551,7 @@
           <a:p>
             <a:fld id="{C47D408F-8A80-EC46-9B06-2A4F39B76EBA}" type="datetimeFigureOut">
               <a:rPr lang="en-US" smtClean="0"/>
-              <a:t>2/5/17</a:t>
+              <a:t>2/6/17</a:t>
             </a:fld>
             <a:endParaRPr lang="en-US"/>
           </a:p>
@@ -5398,8 +5398,8 @@
         </p:nvSpPr>
         <p:spPr>
           <a:xfrm>
-            <a:off x="306574" y="5712276"/>
-            <a:ext cx="8918072" cy="584775"/>
+            <a:off x="306574" y="5816450"/>
+            <a:ext cx="8918072" cy="338554"/>
           </a:xfrm>
           <a:prstGeom prst="rect">
             <a:avLst/>
@@ -5416,57 +5416,23 @@
           <a:lstStyle/>
           <a:p>
             <a:r>
-              <a:rPr lang="mr-IN" sz="1600" dirty="0">
+              <a:rPr lang="en-US" sz="1600" smtClean="0">
                 <a:latin typeface="Times New Roman" charset="0"/>
                 <a:ea typeface="Times New Roman" charset="0"/>
                 <a:cs typeface="Times New Roman" charset="0"/>
               </a:rPr>
-              <a:t>…</a:t>
-            </a:r>
-            <a:r>
-              <a:rPr lang="en-CA" sz="1600" dirty="0">
+              <a:t>He </a:t>
+            </a:r>
+            <a:r>
+              <a:rPr lang="en-US" sz="1600" dirty="0" smtClean="0">
                 <a:latin typeface="Times New Roman" charset="0"/>
                 <a:ea typeface="Times New Roman" charset="0"/>
                 <a:cs typeface="Times New Roman" charset="0"/>
               </a:rPr>
-              <a:t> </a:t>
-            </a:r>
-            <a:r>
-              <a:rPr lang="en-US" sz="1600" dirty="0">
-                <a:latin typeface="Times New Roman" charset="0"/>
-                <a:ea typeface="Times New Roman" charset="0"/>
-                <a:cs typeface="Times New Roman" charset="0"/>
-              </a:rPr>
-              <a:t> achievements from space did not appear off </a:t>
-            </a:r>
-            <a:r>
-              <a:rPr lang="mr-IN" sz="1600" dirty="0">
-                <a:latin typeface="Times New Roman" charset="0"/>
-                <a:ea typeface="Times New Roman" charset="0"/>
-                <a:cs typeface="Times New Roman" charset="0"/>
-              </a:rPr>
-              <a:t>–</a:t>
-            </a:r>
-            <a:r>
-              <a:rPr lang="en-US" sz="1600" dirty="0">
-                <a:latin typeface="Times New Roman" charset="0"/>
-                <a:ea typeface="Times New Roman" charset="0"/>
-                <a:cs typeface="Times New Roman" charset="0"/>
-              </a:rPr>
-              <a:t> the  charts from a scientific point of view. </a:t>
-            </a:r>
-          </a:p>
-          <a:p>
-            <a:r>
-              <a:rPr lang="en-US" sz="1600" dirty="0">
-                <a:latin typeface="Times New Roman" charset="0"/>
-                <a:ea typeface="Times New Roman" charset="0"/>
-                <a:cs typeface="Times New Roman" charset="0"/>
-              </a:rPr>
-              <a:t>He dropped a puck from space for the </a:t>
-            </a:r>
-            <a:r>
-              <a:rPr lang="en-US" sz="1600" dirty="0">
+              <a:t>dropped a puck from space for the </a:t>
+            </a:r>
+            <a:r>
+              <a:rPr lang="en-US" sz="1600" dirty="0" smtClean="0">
                 <a:solidFill>
                   <a:schemeClr val="accent6">
                     <a:lumMod val="75000"/>
@@ -5479,20 +5445,12 @@
               <a:t>Toronto Maple Leafs </a:t>
             </a:r>
             <a:r>
-              <a:rPr lang="en-US" sz="1600" dirty="0">
-                <a:latin typeface="Times New Roman" charset="0"/>
-                <a:ea typeface="Times New Roman" charset="0"/>
-                <a:cs typeface="Times New Roman" charset="0"/>
-              </a:rPr>
-              <a:t>' home opener against the Buffalo </a:t>
-            </a:r>
-            <a:r>
               <a:rPr lang="en-US" sz="1600" dirty="0" smtClean="0">
                 <a:latin typeface="Times New Roman" charset="0"/>
                 <a:ea typeface="Times New Roman" charset="0"/>
                 <a:cs typeface="Times New Roman" charset="0"/>
               </a:rPr>
-              <a:t>Sabres.</a:t>
+              <a:t>' home opener against the Buffalo Sabres.</a:t>
             </a:r>
             <a:endParaRPr lang="en-US" sz="1600" dirty="0">
               <a:latin typeface="Times New Roman" charset="0"/>
@@ -5510,7 +5468,7 @@
         </p:nvSpPr>
         <p:spPr>
           <a:xfrm>
-            <a:off x="3533724" y="6015642"/>
+            <a:off x="3533724" y="5865172"/>
             <a:ext cx="1778339" cy="240237"/>
           </a:xfrm>
           <a:prstGeom prst="rect">
@@ -5559,7 +5517,7 @@
         </p:nvSpPr>
         <p:spPr>
           <a:xfrm>
-            <a:off x="-522227" y="6015642"/>
+            <a:off x="-522227" y="5865172"/>
             <a:ext cx="4017305" cy="240237"/>
           </a:xfrm>
           <a:prstGeom prst="rect">
@@ -5608,7 +5566,7 @@
         </p:nvSpPr>
         <p:spPr>
           <a:xfrm>
-            <a:off x="5362498" y="6021510"/>
+            <a:off x="5362498" y="5871040"/>
             <a:ext cx="4045215" cy="234369"/>
           </a:xfrm>
           <a:prstGeom prst="rect">

</xml_diff>